<commit_message>
Adjust pptx golden tests.
</commit_message>
<xml_diff>
--- a/test/pptx/background-image/deleted-layouts.pptx
+++ b/test/pptx/background-image/deleted-layouts.pptx
@@ -519,47 +519,7 @@
             </a:pPr>
             <a:r>
               <a:rPr/>
-              <a:t>Blank</a:t>
-            </a:r>
-            <a:r>
-              <a:rPr/>
-              <a:t> </a:t>
-            </a:r>
-            <a:r>
-              <a:rPr/>
-              <a:t>slides</a:t>
-            </a:r>
-            <a:r>
-              <a:rPr/>
-              <a:t> </a:t>
-            </a:r>
-            <a:r>
-              <a:rPr/>
-              <a:t>can</a:t>
-            </a:r>
-            <a:r>
-              <a:rPr/>
-              <a:t> </a:t>
-            </a:r>
-            <a:r>
-              <a:rPr/>
-              <a:t>have</a:t>
-            </a:r>
-            <a:r>
-              <a:rPr/>
-              <a:t> </a:t>
-            </a:r>
-            <a:r>
-              <a:rPr/>
-              <a:t>background</a:t>
-            </a:r>
-            <a:r>
-              <a:rPr/>
-              <a:t> </a:t>
-            </a:r>
-            <a:r>
-              <a:rPr/>
-              <a:t>images.</a:t>
+              <a:t>Blank slides can have background images.</a:t>
             </a:r>
           </a:p>
         </p:txBody>
@@ -3831,39 +3791,7 @@
             </a:pPr>
             <a:r>
               <a:rPr/>
-              <a:t>Section</a:t>
-            </a:r>
-            <a:r>
-              <a:rPr/>
-              <a:t> </a:t>
-            </a:r>
-            <a:r>
-              <a:rPr/>
-              <a:t>Header</a:t>
-            </a:r>
-            <a:r>
-              <a:rPr/>
-              <a:t> </a:t>
-            </a:r>
-            <a:r>
-              <a:rPr/>
-              <a:t>(with</a:t>
-            </a:r>
-            <a:r>
-              <a:rPr/>
-              <a:t> </a:t>
-            </a:r>
-            <a:r>
-              <a:rPr/>
-              <a:t>background</a:t>
-            </a:r>
-            <a:r>
-              <a:rPr/>
-              <a:t> </a:t>
-            </a:r>
-            <a:r>
-              <a:rPr/>
-              <a:t>image)</a:t>
+              <a:t>Section Header (with background image)</a:t>
             </a:r>
           </a:p>
         </p:txBody>
@@ -3924,15 +3852,7 @@
             </a:pPr>
             <a:r>
               <a:rPr/>
-              <a:t>Slide</a:t>
-            </a:r>
-            <a:r>
-              <a:rPr/>
-              <a:t> </a:t>
-            </a:r>
-            <a:r>
-              <a:rPr/>
-              <a:t>1</a:t>
+              <a:t>Slide 1</a:t>
             </a:r>
           </a:p>
         </p:txBody>
@@ -4018,15 +3938,7 @@
             </a:pPr>
             <a:r>
               <a:rPr/>
-              <a:t>Slide</a:t>
-            </a:r>
-            <a:r>
-              <a:rPr/>
-              <a:t> </a:t>
-            </a:r>
-            <a:r>
-              <a:rPr/>
-              <a:t>2</a:t>
+              <a:t>Slide 2</a:t>
             </a:r>
           </a:p>
         </p:txBody>
@@ -4112,15 +4024,7 @@
             </a:pPr>
             <a:r>
               <a:rPr/>
-              <a:t>Slide</a:t>
-            </a:r>
-            <a:r>
-              <a:rPr/>
-              <a:t> </a:t>
-            </a:r>
-            <a:r>
-              <a:rPr/>
-              <a:t>3</a:t>
+              <a:t>Slide 3</a:t>
             </a:r>
           </a:p>
         </p:txBody>
@@ -4236,15 +4140,7 @@
             </a:pPr>
             <a:r>
               <a:rPr/>
-              <a:t>Slide</a:t>
-            </a:r>
-            <a:r>
-              <a:rPr/>
-              <a:t> </a:t>
-            </a:r>
-            <a:r>
-              <a:rPr/>
-              <a:t>4</a:t>
+              <a:t>Slide 4</a:t>
             </a:r>
           </a:p>
         </p:txBody>
@@ -4329,15 +4225,7 @@
             </a:pPr>
             <a:r>
               <a:rPr/>
-              <a:t>An</a:t>
-            </a:r>
-            <a:r>
-              <a:rPr/>
-              <a:t> </a:t>
-            </a:r>
-            <a:r>
-              <a:rPr/>
-              <a:t>image</a:t>
+              <a:t>An image</a:t>
             </a:r>
           </a:p>
         </p:txBody>

</xml_diff>

<commit_message>
Powerpoint writer: consolidate text run nodes.
This should reduce the size of the generated files.
</commit_message>
<xml_diff>
--- a/test/pptx/background-image/deleted-layouts.pptx
+++ b/test/pptx/background-image/deleted-layouts.pptx
@@ -519,43 +519,23 @@
             </a:pPr>
             <a:r>
               <a:rPr/>
-              <a:t>Blank</a:t>
+              <a:t>Blank </a:t>
             </a:r>
             <a:r>
               <a:rPr/>
-              <a:t> </a:t>
+              <a:t>slides </a:t>
             </a:r>
             <a:r>
               <a:rPr/>
-              <a:t>slides</a:t>
+              <a:t>can </a:t>
             </a:r>
             <a:r>
               <a:rPr/>
-              <a:t> </a:t>
+              <a:t>have </a:t>
             </a:r>
             <a:r>
               <a:rPr/>
-              <a:t>can</a:t>
-            </a:r>
-            <a:r>
-              <a:rPr/>
-              <a:t> </a:t>
-            </a:r>
-            <a:r>
-              <a:rPr/>
-              <a:t>have</a:t>
-            </a:r>
-            <a:r>
-              <a:rPr/>
-              <a:t> </a:t>
-            </a:r>
-            <a:r>
-              <a:rPr/>
-              <a:t>background</a:t>
-            </a:r>
-            <a:r>
-              <a:rPr/>
-              <a:t> </a:t>
+              <a:t>background </a:t>
             </a:r>
             <a:r>
               <a:rPr/>
@@ -3831,35 +3811,19 @@
             </a:pPr>
             <a:r>
               <a:rPr/>
-              <a:t>Section</a:t>
+              <a:t>Section </a:t>
             </a:r>
             <a:r>
               <a:rPr/>
-              <a:t> </a:t>
+              <a:t>Header </a:t>
             </a:r>
             <a:r>
               <a:rPr/>
-              <a:t>Header</a:t>
+              <a:t>(with </a:t>
             </a:r>
             <a:r>
               <a:rPr/>
-              <a:t> </a:t>
-            </a:r>
-            <a:r>
-              <a:rPr/>
-              <a:t>(with</a:t>
-            </a:r>
-            <a:r>
-              <a:rPr/>
-              <a:t> </a:t>
-            </a:r>
-            <a:r>
-              <a:rPr/>
-              <a:t>background</a:t>
-            </a:r>
-            <a:r>
-              <a:rPr/>
-              <a:t> </a:t>
+              <a:t>background </a:t>
             </a:r>
             <a:r>
               <a:rPr/>
@@ -3924,11 +3888,7 @@
             </a:pPr>
             <a:r>
               <a:rPr/>
-              <a:t>Slide</a:t>
-            </a:r>
-            <a:r>
-              <a:rPr/>
-              <a:t> </a:t>
+              <a:t>Slide </a:t>
             </a:r>
             <a:r>
               <a:rPr/>
@@ -4018,11 +3978,7 @@
             </a:pPr>
             <a:r>
               <a:rPr/>
-              <a:t>Slide</a:t>
-            </a:r>
-            <a:r>
-              <a:rPr/>
-              <a:t> </a:t>
+              <a:t>Slide </a:t>
             </a:r>
             <a:r>
               <a:rPr/>
@@ -4112,11 +4068,7 @@
             </a:pPr>
             <a:r>
               <a:rPr/>
-              <a:t>Slide</a:t>
-            </a:r>
-            <a:r>
-              <a:rPr/>
-              <a:t> </a:t>
+              <a:t>Slide </a:t>
             </a:r>
             <a:r>
               <a:rPr/>
@@ -4236,11 +4188,7 @@
             </a:pPr>
             <a:r>
               <a:rPr/>
-              <a:t>Slide</a:t>
-            </a:r>
-            <a:r>
-              <a:rPr/>
-              <a:t> </a:t>
+              <a:t>Slide </a:t>
             </a:r>
             <a:r>
               <a:rPr/>
@@ -4329,11 +4277,7 @@
             </a:pPr>
             <a:r>
               <a:rPr/>
-              <a:t>An</a:t>
-            </a:r>
-            <a:r>
-              <a:rPr/>
-              <a:t> </a:t>
+              <a:t>An </a:t>
             </a:r>
             <a:r>
               <a:rPr/>

</xml_diff>

<commit_message>
Revert "Powerpoint writer: consolidate text run nodes."
This reverts commit 62f83aa48633af477913bde6f615fe9f8793901a.

This was already being done, it seems.
I misidentified the problem; it is really with `Str ""` nodes.
</commit_message>
<xml_diff>
--- a/test/pptx/background-image/deleted-layouts.pptx
+++ b/test/pptx/background-image/deleted-layouts.pptx
@@ -519,23 +519,43 @@
             </a:pPr>
             <a:r>
               <a:rPr/>
-              <a:t>Blank </a:t>
+              <a:t>Blank</a:t>
             </a:r>
             <a:r>
               <a:rPr/>
-              <a:t>slides </a:t>
+              <a:t> </a:t>
             </a:r>
             <a:r>
               <a:rPr/>
-              <a:t>can </a:t>
+              <a:t>slides</a:t>
             </a:r>
             <a:r>
               <a:rPr/>
-              <a:t>have </a:t>
+              <a:t> </a:t>
             </a:r>
             <a:r>
               <a:rPr/>
-              <a:t>background </a:t>
+              <a:t>can</a:t>
+            </a:r>
+            <a:r>
+              <a:rPr/>
+              <a:t> </a:t>
+            </a:r>
+            <a:r>
+              <a:rPr/>
+              <a:t>have</a:t>
+            </a:r>
+            <a:r>
+              <a:rPr/>
+              <a:t> </a:t>
+            </a:r>
+            <a:r>
+              <a:rPr/>
+              <a:t>background</a:t>
+            </a:r>
+            <a:r>
+              <a:rPr/>
+              <a:t> </a:t>
             </a:r>
             <a:r>
               <a:rPr/>
@@ -3811,19 +3831,35 @@
             </a:pPr>
             <a:r>
               <a:rPr/>
-              <a:t>Section </a:t>
+              <a:t>Section</a:t>
             </a:r>
             <a:r>
               <a:rPr/>
-              <a:t>Header </a:t>
+              <a:t> </a:t>
             </a:r>
             <a:r>
               <a:rPr/>
-              <a:t>(with </a:t>
+              <a:t>Header</a:t>
             </a:r>
             <a:r>
               <a:rPr/>
-              <a:t>background </a:t>
+              <a:t> </a:t>
+            </a:r>
+            <a:r>
+              <a:rPr/>
+              <a:t>(with</a:t>
+            </a:r>
+            <a:r>
+              <a:rPr/>
+              <a:t> </a:t>
+            </a:r>
+            <a:r>
+              <a:rPr/>
+              <a:t>background</a:t>
+            </a:r>
+            <a:r>
+              <a:rPr/>
+              <a:t> </a:t>
             </a:r>
             <a:r>
               <a:rPr/>
@@ -3888,7 +3924,11 @@
             </a:pPr>
             <a:r>
               <a:rPr/>
-              <a:t>Slide </a:t>
+              <a:t>Slide</a:t>
+            </a:r>
+            <a:r>
+              <a:rPr/>
+              <a:t> </a:t>
             </a:r>
             <a:r>
               <a:rPr/>
@@ -3978,7 +4018,11 @@
             </a:pPr>
             <a:r>
               <a:rPr/>
-              <a:t>Slide </a:t>
+              <a:t>Slide</a:t>
+            </a:r>
+            <a:r>
+              <a:rPr/>
+              <a:t> </a:t>
             </a:r>
             <a:r>
               <a:rPr/>
@@ -4068,7 +4112,11 @@
             </a:pPr>
             <a:r>
               <a:rPr/>
-              <a:t>Slide </a:t>
+              <a:t>Slide</a:t>
+            </a:r>
+            <a:r>
+              <a:rPr/>
+              <a:t> </a:t>
             </a:r>
             <a:r>
               <a:rPr/>
@@ -4188,7 +4236,11 @@
             </a:pPr>
             <a:r>
               <a:rPr/>
-              <a:t>Slide </a:t>
+              <a:t>Slide</a:t>
+            </a:r>
+            <a:r>
+              <a:rPr/>
+              <a:t> </a:t>
             </a:r>
             <a:r>
               <a:rPr/>
@@ -4277,7 +4329,11 @@
             </a:pPr>
             <a:r>
               <a:rPr/>
-              <a:t>An </a:t>
+              <a:t>An</a:t>
+            </a:r>
+            <a:r>
+              <a:rPr/>
+              <a:t> </a:t>
             </a:r>
             <a:r>
               <a:rPr/>

</xml_diff>

<commit_message>
Powerpoint writer: consolidate text runs when possible.
This slims down the output files by avoiding unnecessary
text run elements.

Updated golden tests.
</commit_message>
<xml_diff>
--- a/test/pptx/background-image/deleted-layouts.pptx
+++ b/test/pptx/background-image/deleted-layouts.pptx
@@ -519,47 +519,7 @@
             </a:pPr>
             <a:r>
               <a:rPr/>
-              <a:t>Blank</a:t>
-            </a:r>
-            <a:r>
-              <a:rPr/>
-              <a:t> </a:t>
-            </a:r>
-            <a:r>
-              <a:rPr/>
-              <a:t>slides</a:t>
-            </a:r>
-            <a:r>
-              <a:rPr/>
-              <a:t> </a:t>
-            </a:r>
-            <a:r>
-              <a:rPr/>
-              <a:t>can</a:t>
-            </a:r>
-            <a:r>
-              <a:rPr/>
-              <a:t> </a:t>
-            </a:r>
-            <a:r>
-              <a:rPr/>
-              <a:t>have</a:t>
-            </a:r>
-            <a:r>
-              <a:rPr/>
-              <a:t> </a:t>
-            </a:r>
-            <a:r>
-              <a:rPr/>
-              <a:t>background</a:t>
-            </a:r>
-            <a:r>
-              <a:rPr/>
-              <a:t> </a:t>
-            </a:r>
-            <a:r>
-              <a:rPr/>
-              <a:t>images.</a:t>
+              <a:t>Blank slides can have background images.</a:t>
             </a:r>
           </a:p>
         </p:txBody>
@@ -3831,39 +3791,7 @@
             </a:pPr>
             <a:r>
               <a:rPr/>
-              <a:t>Section</a:t>
-            </a:r>
-            <a:r>
-              <a:rPr/>
-              <a:t> </a:t>
-            </a:r>
-            <a:r>
-              <a:rPr/>
-              <a:t>Header</a:t>
-            </a:r>
-            <a:r>
-              <a:rPr/>
-              <a:t> </a:t>
-            </a:r>
-            <a:r>
-              <a:rPr/>
-              <a:t>(with</a:t>
-            </a:r>
-            <a:r>
-              <a:rPr/>
-              <a:t> </a:t>
-            </a:r>
-            <a:r>
-              <a:rPr/>
-              <a:t>background</a:t>
-            </a:r>
-            <a:r>
-              <a:rPr/>
-              <a:t> </a:t>
-            </a:r>
-            <a:r>
-              <a:rPr/>
-              <a:t>image)</a:t>
+              <a:t>Section Header (with background image)</a:t>
             </a:r>
           </a:p>
         </p:txBody>
@@ -3924,15 +3852,7 @@
             </a:pPr>
             <a:r>
               <a:rPr/>
-              <a:t>Slide</a:t>
-            </a:r>
-            <a:r>
-              <a:rPr/>
-              <a:t> </a:t>
-            </a:r>
-            <a:r>
-              <a:rPr/>
-              <a:t>1</a:t>
+              <a:t>Slide 1</a:t>
             </a:r>
           </a:p>
         </p:txBody>
@@ -4018,15 +3938,7 @@
             </a:pPr>
             <a:r>
               <a:rPr/>
-              <a:t>Slide</a:t>
-            </a:r>
-            <a:r>
-              <a:rPr/>
-              <a:t> </a:t>
-            </a:r>
-            <a:r>
-              <a:rPr/>
-              <a:t>2</a:t>
+              <a:t>Slide 2</a:t>
             </a:r>
           </a:p>
         </p:txBody>
@@ -4112,15 +4024,7 @@
             </a:pPr>
             <a:r>
               <a:rPr/>
-              <a:t>Slide</a:t>
-            </a:r>
-            <a:r>
-              <a:rPr/>
-              <a:t> </a:t>
-            </a:r>
-            <a:r>
-              <a:rPr/>
-              <a:t>3</a:t>
+              <a:t>Slide 3</a:t>
             </a:r>
           </a:p>
         </p:txBody>
@@ -4236,15 +4140,7 @@
             </a:pPr>
             <a:r>
               <a:rPr/>
-              <a:t>Slide</a:t>
-            </a:r>
-            <a:r>
-              <a:rPr/>
-              <a:t> </a:t>
-            </a:r>
-            <a:r>
-              <a:rPr/>
-              <a:t>4</a:t>
+              <a:t>Slide 4</a:t>
             </a:r>
           </a:p>
         </p:txBody>
@@ -4329,15 +4225,7 @@
             </a:pPr>
             <a:r>
               <a:rPr/>
-              <a:t>An</a:t>
-            </a:r>
-            <a:r>
-              <a:rPr/>
-              <a:t> </a:t>
-            </a:r>
-            <a:r>
-              <a:rPr/>
-              <a:t>image</a:t>
+              <a:t>An image</a:t>
             </a:r>
           </a:p>
         </p:txBody>

</xml_diff>